<commit_message>
Update dashboard and slides.
</commit_message>
<xml_diff>
--- a/Presentation.pptx
+++ b/Presentation.pptx
@@ -230,7 +230,7 @@
           <a:p>
             <a:fld id="{3EEC5A8C-BDF2-4523-AE53-89289CF1A7EF}" type="datetimeFigureOut">
               <a:rPr lang="en-US"/>
-              <a:t>4/19/22</a:t>
+              <a:t>4/20/22</a:t>
             </a:fld>
             <a:endParaRPr lang="en-US"/>
           </a:p>
@@ -2200,7 +2200,7 @@
           <a:p>
             <a:fld id="{846CE7D5-CF57-46EF-B807-FDD0502418D4}" type="datetimeFigureOut">
               <a:rPr lang="en-US" smtClean="0"/>
-              <a:t>4/19/22</a:t>
+              <a:t>4/20/22</a:t>
             </a:fld>
             <a:endParaRPr lang="en-US"/>
           </a:p>
@@ -2368,7 +2368,7 @@
           <a:p>
             <a:fld id="{846CE7D5-CF57-46EF-B807-FDD0502418D4}" type="datetimeFigureOut">
               <a:rPr lang="en-US" smtClean="0"/>
-              <a:t>4/19/22</a:t>
+              <a:t>4/20/22</a:t>
             </a:fld>
             <a:endParaRPr lang="en-US"/>
           </a:p>
@@ -2546,7 +2546,7 @@
           <a:p>
             <a:fld id="{846CE7D5-CF57-46EF-B807-FDD0502418D4}" type="datetimeFigureOut">
               <a:rPr lang="en-US" smtClean="0"/>
-              <a:t>4/19/22</a:t>
+              <a:t>4/20/22</a:t>
             </a:fld>
             <a:endParaRPr lang="en-US"/>
           </a:p>
@@ -3219,7 +3219,7 @@
           <a:p>
             <a:fld id="{846CE7D5-CF57-46EF-B807-FDD0502418D4}" type="datetimeFigureOut">
               <a:rPr lang="en-US" smtClean="0"/>
-              <a:t>4/19/22</a:t>
+              <a:t>4/20/22</a:t>
             </a:fld>
             <a:endParaRPr lang="en-US"/>
           </a:p>
@@ -3464,7 +3464,7 @@
           <a:p>
             <a:fld id="{846CE7D5-CF57-46EF-B807-FDD0502418D4}" type="datetimeFigureOut">
               <a:rPr lang="en-US" smtClean="0"/>
-              <a:t>4/19/22</a:t>
+              <a:t>4/20/22</a:t>
             </a:fld>
             <a:endParaRPr lang="en-US"/>
           </a:p>
@@ -3693,7 +3693,7 @@
           <a:p>
             <a:fld id="{846CE7D5-CF57-46EF-B807-FDD0502418D4}" type="datetimeFigureOut">
               <a:rPr lang="en-US" smtClean="0"/>
-              <a:t>4/19/22</a:t>
+              <a:t>4/20/22</a:t>
             </a:fld>
             <a:endParaRPr lang="en-US"/>
           </a:p>
@@ -4057,7 +4057,7 @@
           <a:p>
             <a:fld id="{846CE7D5-CF57-46EF-B807-FDD0502418D4}" type="datetimeFigureOut">
               <a:rPr lang="en-US" smtClean="0"/>
-              <a:t>4/19/22</a:t>
+              <a:t>4/20/22</a:t>
             </a:fld>
             <a:endParaRPr lang="en-US"/>
           </a:p>
@@ -4174,7 +4174,7 @@
           <a:p>
             <a:fld id="{846CE7D5-CF57-46EF-B807-FDD0502418D4}" type="datetimeFigureOut">
               <a:rPr lang="en-US" smtClean="0"/>
-              <a:t>4/19/22</a:t>
+              <a:t>4/20/22</a:t>
             </a:fld>
             <a:endParaRPr lang="en-US"/>
           </a:p>
@@ -4269,7 +4269,7 @@
           <a:p>
             <a:fld id="{846CE7D5-CF57-46EF-B807-FDD0502418D4}" type="datetimeFigureOut">
               <a:rPr lang="en-US" smtClean="0"/>
-              <a:t>4/19/22</a:t>
+              <a:t>4/20/22</a:t>
             </a:fld>
             <a:endParaRPr lang="en-US"/>
           </a:p>
@@ -4544,7 +4544,7 @@
           <a:p>
             <a:fld id="{846CE7D5-CF57-46EF-B807-FDD0502418D4}" type="datetimeFigureOut">
               <a:rPr lang="en-US" smtClean="0"/>
-              <a:t>4/19/22</a:t>
+              <a:t>4/20/22</a:t>
             </a:fld>
             <a:endParaRPr lang="en-US"/>
           </a:p>
@@ -4799,7 +4799,7 @@
           <a:p>
             <a:fld id="{846CE7D5-CF57-46EF-B807-FDD0502418D4}" type="datetimeFigureOut">
               <a:rPr lang="en-US" smtClean="0"/>
-              <a:t>4/19/22</a:t>
+              <a:t>4/20/22</a:t>
             </a:fld>
             <a:endParaRPr lang="en-US"/>
           </a:p>
@@ -5010,7 +5010,7 @@
           <a:p>
             <a:fld id="{846CE7D5-CF57-46EF-B807-FDD0502418D4}" type="datetimeFigureOut">
               <a:rPr lang="en-US" smtClean="0"/>
-              <a:t>4/19/22</a:t>
+              <a:t>4/20/22</a:t>
             </a:fld>
             <a:endParaRPr lang="en-US"/>
           </a:p>
@@ -6302,10 +6302,20 @@
               <a:buFont typeface="Arial,Sans-Serif"/>
               <a:buChar char="•"/>
             </a:pPr>
-            <a:endParaRPr lang="en-US" dirty="0">
-              <a:ea typeface="+mn-lt"/>
-              <a:cs typeface="+mn-lt"/>
-            </a:endParaRPr>
+            <a:r>
+              <a:rPr lang="en-US" b="1" dirty="0">
+                <a:ea typeface="+mn-lt"/>
+                <a:cs typeface="+mn-lt"/>
+              </a:rPr>
+              <a:t>At least half </a:t>
+            </a:r>
+            <a:r>
+              <a:rPr lang="en-US" dirty="0">
+                <a:ea typeface="+mn-lt"/>
+                <a:cs typeface="+mn-lt"/>
+              </a:rPr>
+              <a:t>of the customers offered the promotion will take it and stay</a:t>
+            </a:r>
           </a:p>
           <a:p>
             <a:pPr marL="714375" lvl="1" indent="-257175">
@@ -6324,7 +6334,7 @@
                 <a:ea typeface="+mn-lt"/>
                 <a:cs typeface="+mn-lt"/>
               </a:rPr>
-              <a:t>15% to 17% uplift </a:t>
+              <a:t>up to around 7.3% uplift </a:t>
             </a:r>
             <a:r>
               <a:rPr lang="en-US" dirty="0">
@@ -6336,78 +6346,6 @@
           </a:p>
         </p:txBody>
       </p:sp>
-      <p:pic>
-        <p:nvPicPr>
-          <p:cNvPr id="12" name="Picture 11" descr="Text&#10;&#10;Description automatically generated">
-            <a:extLst>
-              <a:ext uri="{FF2B5EF4-FFF2-40B4-BE49-F238E27FC236}">
-                <a16:creationId xmlns:a16="http://schemas.microsoft.com/office/drawing/2014/main" id="{B463A370-154B-9348-A638-E825818C6248}"/>
-              </a:ext>
-            </a:extLst>
-          </p:cNvPr>
-          <p:cNvPicPr>
-            <a:picLocks noChangeAspect="1"/>
-          </p:cNvPicPr>
-          <p:nvPr/>
-        </p:nvPicPr>
-        <p:blipFill>
-          <a:blip r:embed="rId3">
-            <a:extLst>
-              <a:ext uri="{28A0092B-C50C-407E-A947-70E740481C1C}">
-                <a14:useLocalDpi xmlns:a14="http://schemas.microsoft.com/office/drawing/2010/main" val="0"/>
-              </a:ext>
-            </a:extLst>
-          </a:blip>
-          <a:stretch>
-            <a:fillRect/>
-          </a:stretch>
-        </p:blipFill>
-        <p:spPr>
-          <a:xfrm>
-            <a:off x="4213898" y="1404267"/>
-            <a:ext cx="7863101" cy="4020232"/>
-          </a:xfrm>
-          <a:prstGeom prst="rect">
-            <a:avLst/>
-          </a:prstGeom>
-        </p:spPr>
-      </p:pic>
-      <p:pic>
-        <p:nvPicPr>
-          <p:cNvPr id="14" name="Picture 13" descr="Table&#10;&#10;Description automatically generated">
-            <a:extLst>
-              <a:ext uri="{FF2B5EF4-FFF2-40B4-BE49-F238E27FC236}">
-                <a16:creationId xmlns:a16="http://schemas.microsoft.com/office/drawing/2014/main" id="{DE838F52-B4A6-904A-AF80-8A857C8215BF}"/>
-              </a:ext>
-            </a:extLst>
-          </p:cNvPr>
-          <p:cNvPicPr>
-            <a:picLocks noChangeAspect="1"/>
-          </p:cNvPicPr>
-          <p:nvPr/>
-        </p:nvPicPr>
-        <p:blipFill>
-          <a:blip r:embed="rId4">
-            <a:extLst>
-              <a:ext uri="{28A0092B-C50C-407E-A947-70E740481C1C}">
-                <a14:useLocalDpi xmlns:a14="http://schemas.microsoft.com/office/drawing/2010/main" val="0"/>
-              </a:ext>
-            </a:extLst>
-          </a:blip>
-          <a:stretch>
-            <a:fillRect/>
-          </a:stretch>
-        </p:blipFill>
-        <p:spPr>
-          <a:xfrm>
-            <a:off x="115471" y="4662501"/>
-            <a:ext cx="4939130" cy="1463953"/>
-          </a:xfrm>
-          <a:prstGeom prst="rect">
-            <a:avLst/>
-          </a:prstGeom>
-        </p:spPr>
-      </p:pic>
     </p:spTree>
     <p:extLst>
       <p:ext uri="{BB962C8B-B14F-4D97-AF65-F5344CB8AC3E}">
@@ -6721,10 +6659,13 @@
               <a:buFont typeface="Arial,Sans-Serif"/>
               <a:buChar char="•"/>
             </a:pPr>
-            <a:endParaRPr lang="en-US" dirty="0">
-              <a:ea typeface="+mn-lt"/>
-              <a:cs typeface="+mn-lt"/>
-            </a:endParaRPr>
+            <a:r>
+              <a:rPr lang="en-US" dirty="0">
+                <a:ea typeface="+mn-lt"/>
+                <a:cs typeface="+mn-lt"/>
+              </a:rPr>
+              <a:t>Customers with low churn risk will not churn for the next 12 months</a:t>
+            </a:r>
           </a:p>
           <a:p>
             <a:pPr marL="714375" lvl="1" indent="-257175">
@@ -6732,11 +6673,18 @@
               <a:buChar char="•"/>
             </a:pPr>
             <a:r>
+              <a:rPr lang="en-US" b="1" dirty="0">
+                <a:ea typeface="+mn-lt"/>
+                <a:cs typeface="+mn-lt"/>
+              </a:rPr>
+              <a:t>At least half </a:t>
+            </a:r>
+            <a:r>
               <a:rPr lang="en-US" dirty="0">
                 <a:ea typeface="+mn-lt"/>
                 <a:cs typeface="+mn-lt"/>
               </a:rPr>
-              <a:t>Customers with low churn risk will not churn for the next 12 months</a:t>
+              <a:t>of the customers offered the promotion will take it and stay</a:t>
             </a:r>
           </a:p>
           <a:p>
@@ -6744,98 +6692,30 @@
               <a:buFont typeface="Arial,Sans-Serif"/>
               <a:buChar char="•"/>
             </a:pPr>
-            <a:endParaRPr lang="en-US" dirty="0">
-              <a:ea typeface="+mn-lt"/>
-              <a:cs typeface="+mn-lt"/>
-            </a:endParaRPr>
-          </a:p>
-          <a:p>
-            <a:pPr marL="714375" lvl="1" indent="-257175">
-              <a:buFont typeface="Arial,Sans-Serif"/>
-              <a:buChar char="•"/>
-            </a:pPr>
             <a:r>
               <a:rPr lang="en-US" dirty="0">
                 <a:ea typeface="+mn-lt"/>
                 <a:cs typeface="+mn-lt"/>
               </a:rPr>
-              <a:t>Between 7% to 9% uplift in annual revenue using locked-in contract promotion</a:t>
-            </a:r>
-          </a:p>
-        </p:txBody>
-      </p:sp>
-      <p:pic>
-        <p:nvPicPr>
-          <p:cNvPr id="3" name="Picture 2" descr="Text&#10;&#10;Description automatically generated">
-            <a:extLst>
-              <a:ext uri="{FF2B5EF4-FFF2-40B4-BE49-F238E27FC236}">
-                <a16:creationId xmlns:a16="http://schemas.microsoft.com/office/drawing/2014/main" id="{0BD15A24-F0E3-0D44-B3D1-BE4ECD0C8BD4}"/>
-              </a:ext>
-            </a:extLst>
-          </p:cNvPr>
-          <p:cNvPicPr>
-            <a:picLocks noChangeAspect="1"/>
-          </p:cNvPicPr>
-          <p:nvPr/>
-        </p:nvPicPr>
-        <p:blipFill>
-          <a:blip r:embed="rId3">
-            <a:extLst>
-              <a:ext uri="{28A0092B-C50C-407E-A947-70E740481C1C}">
-                <a14:useLocalDpi xmlns:a14="http://schemas.microsoft.com/office/drawing/2010/main" val="0"/>
-              </a:ext>
-            </a:extLst>
-          </a:blip>
-          <a:stretch>
-            <a:fillRect/>
-          </a:stretch>
-        </p:blipFill>
-        <p:spPr>
-          <a:xfrm>
-            <a:off x="4046553" y="1399834"/>
-            <a:ext cx="7995024" cy="4058332"/>
-          </a:xfrm>
-          <a:prstGeom prst="rect">
-            <a:avLst/>
-          </a:prstGeom>
-        </p:spPr>
-      </p:pic>
-      <p:pic>
-        <p:nvPicPr>
-          <p:cNvPr id="6" name="Picture 5" descr="Table&#10;&#10;Description automatically generated">
-            <a:extLst>
-              <a:ext uri="{FF2B5EF4-FFF2-40B4-BE49-F238E27FC236}">
-                <a16:creationId xmlns:a16="http://schemas.microsoft.com/office/drawing/2014/main" id="{A071E3DA-9E0A-4544-ACE3-D1DE46778AD0}"/>
-              </a:ext>
-            </a:extLst>
-          </p:cNvPr>
-          <p:cNvPicPr>
-            <a:picLocks noChangeAspect="1"/>
-          </p:cNvPicPr>
-          <p:nvPr/>
-        </p:nvPicPr>
-        <p:blipFill>
-          <a:blip r:embed="rId4">
-            <a:extLst>
-              <a:ext uri="{28A0092B-C50C-407E-A947-70E740481C1C}">
-                <a14:useLocalDpi xmlns:a14="http://schemas.microsoft.com/office/drawing/2010/main" val="0"/>
-              </a:ext>
-            </a:extLst>
-          </a:blip>
-          <a:stretch>
-            <a:fillRect/>
-          </a:stretch>
-        </p:blipFill>
-        <p:spPr>
-          <a:xfrm>
-            <a:off x="207818" y="5301084"/>
-            <a:ext cx="4419600" cy="1181100"/>
-          </a:xfrm>
-          <a:prstGeom prst="rect">
-            <a:avLst/>
-          </a:prstGeom>
-        </p:spPr>
-      </p:pic>
+              <a:t>Around </a:t>
+            </a:r>
+            <a:r>
+              <a:rPr lang="en-US" b="1" dirty="0">
+                <a:ea typeface="+mn-lt"/>
+                <a:cs typeface="+mn-lt"/>
+              </a:rPr>
+              <a:t>2.4% uplift </a:t>
+            </a:r>
+            <a:r>
+              <a:rPr lang="en-US" dirty="0">
+                <a:ea typeface="+mn-lt"/>
+                <a:cs typeface="+mn-lt"/>
+              </a:rPr>
+              <a:t>in annual revenue using locked-in contract promotion</a:t>
+            </a:r>
+          </a:p>
+        </p:txBody>
+      </p:sp>
     </p:spTree>
     <p:extLst>
       <p:ext uri="{BB962C8B-B14F-4D97-AF65-F5344CB8AC3E}">

</xml_diff>

<commit_message>
Presentation and dashboard updated.
</commit_message>
<xml_diff>
--- a/Presentation.pptx
+++ b/Presentation.pptx
@@ -6012,7 +6012,7 @@
                 <a:ea typeface="+mn-lt"/>
                 <a:cs typeface="+mn-lt"/>
               </a:rPr>
-              <a:t>We can possibly offer promotions focused on charges and/or contract type to change churn propensity in high risk customers</a:t>
+              <a:t>We can possibly offer promotions focused on charges and/or contract type to change churn propensity in high-risk customers</a:t>
             </a:r>
           </a:p>
         </p:txBody>
@@ -6334,7 +6334,7 @@
                 <a:ea typeface="+mn-lt"/>
                 <a:cs typeface="+mn-lt"/>
               </a:rPr>
-              <a:t>up to around 7.3% uplift </a:t>
+              <a:t>up to around 7.1% uplift </a:t>
             </a:r>
             <a:r>
               <a:rPr lang="en-US" dirty="0">
@@ -6348,10 +6348,10 @@
       </p:sp>
       <p:pic>
         <p:nvPicPr>
-          <p:cNvPr id="5" name="Picture 4" descr="Table&#10;&#10;Description automatically generated with medium confidence">
+          <p:cNvPr id="4" name="Picture 3" descr="Text&#10;&#10;Description automatically generated">
             <a:extLst>
               <a:ext uri="{FF2B5EF4-FFF2-40B4-BE49-F238E27FC236}">
-                <a16:creationId xmlns:a16="http://schemas.microsoft.com/office/drawing/2014/main" id="{0F8F1CC9-69DD-3545-A000-5B9D307BA71B}"/>
+                <a16:creationId xmlns:a16="http://schemas.microsoft.com/office/drawing/2014/main" id="{28148EC6-A44F-4C41-AC47-8CA73A437C58}"/>
               </a:ext>
             </a:extLst>
           </p:cNvPr>
@@ -6374,8 +6374,8 @@
         </p:blipFill>
         <p:spPr>
           <a:xfrm>
-            <a:off x="131495" y="4907932"/>
-            <a:ext cx="5029200" cy="1270000"/>
+            <a:off x="5016258" y="1548466"/>
+            <a:ext cx="7111356" cy="4554567"/>
           </a:xfrm>
           <a:prstGeom prst="rect">
             <a:avLst/>
@@ -6384,10 +6384,10 @@
       </p:pic>
       <p:pic>
         <p:nvPicPr>
-          <p:cNvPr id="4" name="Picture 3" descr="Text&#10;&#10;Description automatically generated">
+          <p:cNvPr id="3" name="Picture 2" descr="Table&#10;&#10;Description automatically generated">
             <a:extLst>
               <a:ext uri="{FF2B5EF4-FFF2-40B4-BE49-F238E27FC236}">
-                <a16:creationId xmlns:a16="http://schemas.microsoft.com/office/drawing/2014/main" id="{28148EC6-A44F-4C41-AC47-8CA73A437C58}"/>
+                <a16:creationId xmlns:a16="http://schemas.microsoft.com/office/drawing/2014/main" id="{DF78A5F4-F442-5F42-893D-CDB76607DD12}"/>
               </a:ext>
             </a:extLst>
           </p:cNvPr>
@@ -6410,8 +6410,8 @@
         </p:blipFill>
         <p:spPr>
           <a:xfrm>
-            <a:off x="5016258" y="1548466"/>
-            <a:ext cx="7111356" cy="4554567"/>
+            <a:off x="791895" y="5231234"/>
+            <a:ext cx="4368800" cy="1320800"/>
           </a:xfrm>
           <a:prstGeom prst="rect">
             <a:avLst/>
@@ -6702,21 +6702,7 @@
                 <a:ea typeface="+mn-lt"/>
                 <a:cs typeface="+mn-lt"/>
               </a:rPr>
-              <a:t>lock</a:t>
-            </a:r>
-            <a:r>
-              <a:rPr lang="en-US" dirty="0">
-                <a:ea typeface="+mn-lt"/>
-                <a:cs typeface="+mn-lt"/>
-              </a:rPr>
-              <a:t> them </a:t>
-            </a:r>
-            <a:r>
-              <a:rPr lang="en-US" b="1" dirty="0">
-                <a:ea typeface="+mn-lt"/>
-                <a:cs typeface="+mn-lt"/>
-              </a:rPr>
-              <a:t>in</a:t>
+              <a:t>locked-in</a:t>
             </a:r>
             <a:r>
               <a:rPr lang="en-US" dirty="0">
@@ -6803,7 +6789,7 @@
                 <a:ea typeface="+mn-lt"/>
                 <a:cs typeface="+mn-lt"/>
               </a:rPr>
-              <a:t> does not have good performance using this strategy:</a:t>
+              <a:t> has worse performance than other solutions using this strategy:</a:t>
             </a:r>
           </a:p>
           <a:p>
@@ -6823,10 +6809,10 @@
       </p:sp>
       <p:pic>
         <p:nvPicPr>
-          <p:cNvPr id="5" name="Picture 4" descr="Table&#10;&#10;Description automatically generated">
+          <p:cNvPr id="8" name="Picture 7" descr="Text&#10;&#10;Description automatically generated">
             <a:extLst>
               <a:ext uri="{FF2B5EF4-FFF2-40B4-BE49-F238E27FC236}">
-                <a16:creationId xmlns:a16="http://schemas.microsoft.com/office/drawing/2014/main" id="{A983F367-BA76-FD4E-BB34-88F8A03FD5B4}"/>
+                <a16:creationId xmlns:a16="http://schemas.microsoft.com/office/drawing/2014/main" id="{04F677CD-F907-8945-864C-78780205F026}"/>
               </a:ext>
             </a:extLst>
           </p:cNvPr>
@@ -6849,8 +6835,8 @@
         </p:blipFill>
         <p:spPr>
           <a:xfrm>
-            <a:off x="855773" y="5468134"/>
-            <a:ext cx="4940300" cy="1181100"/>
+            <a:off x="5800561" y="1464869"/>
+            <a:ext cx="6183619" cy="4252766"/>
           </a:xfrm>
           <a:prstGeom prst="rect">
             <a:avLst/>
@@ -6859,10 +6845,10 @@
       </p:pic>
       <p:pic>
         <p:nvPicPr>
-          <p:cNvPr id="8" name="Picture 7" descr="Text&#10;&#10;Description automatically generated">
+          <p:cNvPr id="3" name="Picture 2" descr="Table&#10;&#10;Description automatically generated">
             <a:extLst>
               <a:ext uri="{FF2B5EF4-FFF2-40B4-BE49-F238E27FC236}">
-                <a16:creationId xmlns:a16="http://schemas.microsoft.com/office/drawing/2014/main" id="{04F677CD-F907-8945-864C-78780205F026}"/>
+                <a16:creationId xmlns:a16="http://schemas.microsoft.com/office/drawing/2014/main" id="{8A9BBBA8-DCE4-534A-9378-050A5C70483B}"/>
               </a:ext>
             </a:extLst>
           </p:cNvPr>
@@ -6885,8 +6871,8 @@
         </p:blipFill>
         <p:spPr>
           <a:xfrm>
-            <a:off x="5800561" y="1464869"/>
-            <a:ext cx="6183619" cy="4252766"/>
+            <a:off x="950912" y="5275684"/>
+            <a:ext cx="4445000" cy="1231900"/>
           </a:xfrm>
           <a:prstGeom prst="rect">
             <a:avLst/>
@@ -7230,7 +7216,7 @@
                 <a:ea typeface="+mn-lt"/>
                 <a:cs typeface="+mn-lt"/>
               </a:rPr>
-              <a:t> a yearly promotion (locked in contract) offered to high-risk customers</a:t>
+              <a:t> a yearly promotion (locked-in contract) offered to high-risk customers</a:t>
             </a:r>
           </a:p>
           <a:p>
@@ -7253,7 +7239,7 @@
                 <a:ea typeface="+mn-lt"/>
                 <a:cs typeface="+mn-lt"/>
               </a:rPr>
-              <a:t>Total revenue from monthly subscriptions are calculated for both groups after several months following the promotions</a:t>
+              <a:t>Total revenues from monthly subscriptions are calculated for both groups after several months following the promotions</a:t>
             </a:r>
           </a:p>
           <a:p>
@@ -7538,7 +7524,7 @@
                 <a:ea typeface="+mn-lt"/>
                 <a:cs typeface="+mn-lt"/>
               </a:rPr>
-              <a:t>We proposed an ML based solution to predict churn propensity of customers from an internet service provider</a:t>
+              <a:t>We proposed an ML based solution to predict churn propensity of customers from an interne service provider</a:t>
             </a:r>
           </a:p>
           <a:p>
@@ -7607,7 +7593,7 @@
                 <a:ea typeface="+mn-lt"/>
                 <a:cs typeface="+mn-lt"/>
               </a:rPr>
-              <a:t>Promotion strategy performances compared offline under assumptions</a:t>
+              <a:t>Promotion strategy performances were compared offline under assumptions</a:t>
             </a:r>
           </a:p>
           <a:p>
@@ -7643,7 +7629,7 @@
                 <a:ea typeface="+mn-lt"/>
                 <a:cs typeface="+mn-lt"/>
               </a:rPr>
-              <a:t>Future work involves testing the model and promotion strategies under real scenario and deploying the winner to production</a:t>
+              <a:t>Future work involves testing the model and promotion strategies under real scenario and deploying the winner solution to production</a:t>
             </a:r>
           </a:p>
         </p:txBody>
@@ -8154,7 +8140,7 @@
                 <a:ea typeface="+mn-lt"/>
                 <a:cs typeface="+mn-lt"/>
               </a:rPr>
-              <a:t>Customer churn is one of the most important KPIs (key performance indicators) for companies that have a subscription- based business model</a:t>
+              <a:t>Customer churn is one of the most important KPIs (key performance indicators) for companies that have a subscription-based business model</a:t>
             </a:r>
           </a:p>
           <a:p>
@@ -8213,7 +8199,7 @@
                 <a:ea typeface="+mn-lt"/>
                 <a:cs typeface="+mn-lt"/>
               </a:rPr>
-              <a:t>Technology, telecom, finance, etc.</a:t>
+              <a:t>Technology, telecom, etc.</a:t>
             </a:r>
           </a:p>
           <a:p>
@@ -8269,7 +8255,7 @@
                 <a:ea typeface="+mn-lt"/>
                 <a:cs typeface="+mn-lt"/>
               </a:rPr>
-              <a:t>If we can successfully identify these customers, we can proactively engage with them, e.g. offer promotions</a:t>
+              <a:t>If we can successfully identify these customers, we can proactively engage with them (e.g. offer promotions) and make them stay</a:t>
             </a:r>
           </a:p>
         </p:txBody>
@@ -8801,6 +8787,7 @@
               <a:solidFill>
                 <a:srgbClr val="00B050"/>
               </a:solidFill>
+              <a:prstDash val="dash"/>
             </a:ln>
           </p:spPr>
           <p:style>
@@ -8948,7 +8935,7 @@
                     <a:schemeClr val="tx1"/>
                   </a:solidFill>
                 </a:rPr>
-                <a:t>Offline Evaluation (Accuracy)</a:t>
+                <a:t>Offline Evaluation (Model)</a:t>
               </a:r>
             </a:p>
           </p:txBody>
@@ -9507,8 +9494,8 @@
         </p:nvSpPr>
         <p:spPr>
           <a:xfrm>
-            <a:off x="661517" y="1318947"/>
-            <a:ext cx="10796999" cy="4836666"/>
+            <a:off x="661517" y="1140468"/>
+            <a:ext cx="11201400" cy="5015145"/>
           </a:xfrm>
           <a:prstGeom prst="rect">
             <a:avLst/>
@@ -9529,7 +9516,7 @@
               <a:buChar char="•"/>
             </a:pPr>
             <a:r>
-              <a:rPr lang="en-US" dirty="0">
+              <a:rPr lang="en-US" b="1" dirty="0">
                 <a:ea typeface="+mn-lt"/>
                 <a:cs typeface="+mn-lt"/>
               </a:rPr>
@@ -9553,10 +9540,10 @@
       </p:sp>
       <p:pic>
         <p:nvPicPr>
-          <p:cNvPr id="3" name="Picture 2" descr="Table&#10;&#10;Description automatically generated">
+          <p:cNvPr id="4" name="Picture 3" descr="Table&#10;&#10;Description automatically generated">
             <a:extLst>
               <a:ext uri="{FF2B5EF4-FFF2-40B4-BE49-F238E27FC236}">
-                <a16:creationId xmlns:a16="http://schemas.microsoft.com/office/drawing/2014/main" id="{C93BB37B-7026-1446-AA35-620E54AB506C}"/>
+                <a16:creationId xmlns:a16="http://schemas.microsoft.com/office/drawing/2014/main" id="{A0681C58-AFAC-524B-B57D-F5B05EF7BC35}"/>
               </a:ext>
             </a:extLst>
           </p:cNvPr>
@@ -9579,8 +9566,8 @@
         </p:blipFill>
         <p:spPr>
           <a:xfrm>
-            <a:off x="443099" y="2244644"/>
-            <a:ext cx="10972800" cy="4432300"/>
+            <a:off x="443099" y="1952394"/>
+            <a:ext cx="11201400" cy="4838700"/>
           </a:xfrm>
           <a:prstGeom prst="rect">
             <a:avLst/>
@@ -9797,7 +9784,7 @@
                 <a:ea typeface="+mn-lt"/>
                 <a:cs typeface="+mn-lt"/>
               </a:rPr>
-              <a:t>transforming any categorical features to numerical features</a:t>
+              <a:t>transforming any categorical features into numerical features</a:t>
             </a:r>
           </a:p>
           <a:p>
@@ -10213,7 +10200,7 @@
                 <a:ea typeface="+mn-lt"/>
                 <a:cs typeface="+mn-lt"/>
               </a:rPr>
-              <a:t>To avoid the features with high values do not dominating when creating the model </a:t>
+              <a:t>To avoid the features with high values dominating when creating the model </a:t>
             </a:r>
           </a:p>
         </p:txBody>
@@ -11006,10 +10993,10 @@
       </p:sp>
       <p:pic>
         <p:nvPicPr>
-          <p:cNvPr id="6" name="Picture 5" descr="Graphical user interface, text, application, email&#10;&#10;Description automatically generated">
+          <p:cNvPr id="17" name="Picture 16" descr="Graphical user interface, text, application, email&#10;&#10;Description automatically generated">
             <a:extLst>
               <a:ext uri="{FF2B5EF4-FFF2-40B4-BE49-F238E27FC236}">
-                <a16:creationId xmlns:a16="http://schemas.microsoft.com/office/drawing/2014/main" id="{104493DB-F345-F844-98F8-E8A05CEA94A7}"/>
+                <a16:creationId xmlns:a16="http://schemas.microsoft.com/office/drawing/2014/main" id="{86557E43-024A-1F49-B1EE-2926E421596B}"/>
               </a:ext>
             </a:extLst>
           </p:cNvPr>
@@ -11032,8 +11019,8 @@
         </p:blipFill>
         <p:spPr>
           <a:xfrm>
-            <a:off x="5788252" y="1148143"/>
-            <a:ext cx="6299141" cy="3011686"/>
+            <a:off x="0" y="1334346"/>
+            <a:ext cx="5559486" cy="2412052"/>
           </a:xfrm>
           <a:prstGeom prst="rect">
             <a:avLst/>
@@ -11042,10 +11029,10 @@
       </p:pic>
       <p:pic>
         <p:nvPicPr>
-          <p:cNvPr id="10" name="Picture 9" descr="Chart, pie chart&#10;&#10;Description automatically generated">
+          <p:cNvPr id="3" name="Picture 2" descr="Graphical user interface, text, application, email&#10;&#10;Description automatically generated">
             <a:extLst>
               <a:ext uri="{FF2B5EF4-FFF2-40B4-BE49-F238E27FC236}">
-                <a16:creationId xmlns:a16="http://schemas.microsoft.com/office/drawing/2014/main" id="{4985140C-3FDD-BA49-B5AF-293EE36CC4AD}"/>
+                <a16:creationId xmlns:a16="http://schemas.microsoft.com/office/drawing/2014/main" id="{10E3C228-45DB-244B-B76A-4D08FE63D23C}"/>
               </a:ext>
             </a:extLst>
           </p:cNvPr>
@@ -11068,8 +11055,8 @@
         </p:blipFill>
         <p:spPr>
           <a:xfrm>
-            <a:off x="5840031" y="4349034"/>
-            <a:ext cx="3867481" cy="2438195"/>
+            <a:off x="5794767" y="1174710"/>
+            <a:ext cx="6193468" cy="3573155"/>
           </a:xfrm>
           <a:prstGeom prst="rect">
             <a:avLst/>
@@ -11078,10 +11065,10 @@
       </p:pic>
       <p:pic>
         <p:nvPicPr>
-          <p:cNvPr id="13" name="Picture 12" descr="Chart&#10;&#10;Description automatically generated with low confidence">
+          <p:cNvPr id="5" name="Picture 4" descr="Chart, pie chart&#10;&#10;Description automatically generated">
             <a:extLst>
               <a:ext uri="{FF2B5EF4-FFF2-40B4-BE49-F238E27FC236}">
-                <a16:creationId xmlns:a16="http://schemas.microsoft.com/office/drawing/2014/main" id="{BD7DC8D2-246B-3D4E-9BAB-D5728761DF69}"/>
+                <a16:creationId xmlns:a16="http://schemas.microsoft.com/office/drawing/2014/main" id="{82C404EA-1048-C94B-98D4-7A3FCB2EFF80}"/>
               </a:ext>
             </a:extLst>
           </p:cNvPr>
@@ -11104,8 +11091,8 @@
         </p:blipFill>
         <p:spPr>
           <a:xfrm>
-            <a:off x="1227579" y="4069499"/>
-            <a:ext cx="4083561" cy="2579735"/>
+            <a:off x="7242132" y="4790557"/>
+            <a:ext cx="2980133" cy="1948912"/>
           </a:xfrm>
           <a:prstGeom prst="rect">
             <a:avLst/>
@@ -11114,10 +11101,10 @@
       </p:pic>
       <p:pic>
         <p:nvPicPr>
-          <p:cNvPr id="17" name="Picture 16" descr="Graphical user interface, text, application, email&#10;&#10;Description automatically generated">
+          <p:cNvPr id="9" name="Picture 8" descr="Chart&#10;&#10;Description automatically generated with medium confidence">
             <a:extLst>
               <a:ext uri="{FF2B5EF4-FFF2-40B4-BE49-F238E27FC236}">
-                <a16:creationId xmlns:a16="http://schemas.microsoft.com/office/drawing/2014/main" id="{86557E43-024A-1F49-B1EE-2926E421596B}"/>
+                <a16:creationId xmlns:a16="http://schemas.microsoft.com/office/drawing/2014/main" id="{B4A38B04-1350-C64A-BA53-D2DD30E09740}"/>
               </a:ext>
             </a:extLst>
           </p:cNvPr>
@@ -11140,8 +11127,8 @@
         </p:blipFill>
         <p:spPr>
           <a:xfrm>
-            <a:off x="0" y="1334346"/>
-            <a:ext cx="5559486" cy="2412052"/>
+            <a:off x="874191" y="3766049"/>
+            <a:ext cx="4421753" cy="2990352"/>
           </a:xfrm>
           <a:prstGeom prst="rect">
             <a:avLst/>

</xml_diff>

<commit_message>
Notebook and slides updated.
</commit_message>
<xml_diff>
--- a/Presentation.pptx
+++ b/Presentation.pptx
@@ -230,7 +230,7 @@
           <a:p>
             <a:fld id="{3EEC5A8C-BDF2-4523-AE53-89289CF1A7EF}" type="datetimeFigureOut">
               <a:rPr lang="en-US"/>
-              <a:t>4/20/22</a:t>
+              <a:t>4/28/22</a:t>
             </a:fld>
             <a:endParaRPr lang="en-US"/>
           </a:p>
@@ -746,7 +746,11 @@
               </a:spcAft>
               <a:buNone/>
             </a:pPr>
-            <a:endParaRPr/>
+            <a:r>
+              <a:rPr lang="en-AU" dirty="0"/>
+              <a:t>We also can get important features using random forests. Looks like top features are charges and contract type. This means we can possibly offer promotions focussed on these two features and influence the customer’s churn behaviour.</a:t>
+            </a:r>
+            <a:endParaRPr dirty="0"/>
           </a:p>
         </p:txBody>
       </p:sp>
@@ -855,7 +859,59 @@
               </a:spcAft>
               <a:buNone/>
             </a:pPr>
-            <a:endParaRPr/>
+            <a:r>
+              <a:rPr lang="en-AU" dirty="0"/>
+              <a:t>So in this section, I present two promotion strategies.</a:t>
+            </a:r>
+          </a:p>
+          <a:p>
+            <a:pPr marL="171450" lvl="0" indent="-171450" algn="l" rtl="0">
+              <a:spcBef>
+                <a:spcPts val="0"/>
+              </a:spcBef>
+              <a:spcAft>
+                <a:spcPts val="0"/>
+              </a:spcAft>
+              <a:buFontTx/>
+              <a:buChar char="-"/>
+            </a:pPr>
+            <a:r>
+              <a:rPr lang="en-AU" dirty="0"/>
+              <a:t>First strategy, we offer promotions on the monthly subscription fee. We use the model to predict which customers would churn and offer them a 20% discount on monthly fee.</a:t>
+            </a:r>
+          </a:p>
+          <a:p>
+            <a:pPr marL="171450" lvl="0" indent="-171450" algn="l" rtl="0">
+              <a:spcBef>
+                <a:spcPts val="0"/>
+              </a:spcBef>
+              <a:spcAft>
+                <a:spcPts val="0"/>
+              </a:spcAft>
+              <a:buFontTx/>
+              <a:buChar char="-"/>
+            </a:pPr>
+            <a:r>
+              <a:rPr lang="en-AU" dirty="0"/>
+              <a:t>We assume that when offered this promotion, half of the customers would fine it tempting enough to stay.</a:t>
+            </a:r>
+          </a:p>
+          <a:p>
+            <a:pPr marL="171450" lvl="0" indent="-171450" algn="l" rtl="0">
+              <a:spcBef>
+                <a:spcPts val="0"/>
+              </a:spcBef>
+              <a:spcAft>
+                <a:spcPts val="0"/>
+              </a:spcAft>
+              <a:buFontTx/>
+              <a:buChar char="-"/>
+            </a:pPr>
+            <a:r>
+              <a:rPr lang="en-AU" dirty="0"/>
+              <a:t>Under this scenario, we calculate the uplift in monthly revenue against the solution without promotion, and we observe around 7% uplift in monthly revenue.</a:t>
+            </a:r>
+            <a:endParaRPr dirty="0"/>
           </a:p>
         </p:txBody>
       </p:sp>
@@ -964,7 +1020,43 @@
               </a:spcAft>
               <a:buNone/>
             </a:pPr>
-            <a:endParaRPr/>
+            <a:r>
+              <a:rPr lang="en-AU" dirty="0"/>
+              <a:t>In the second strategy, we offer a bigger promotion of 40% but lock in the customers for one year.</a:t>
+            </a:r>
+          </a:p>
+          <a:p>
+            <a:pPr marL="171450" lvl="0" indent="-171450" algn="l" rtl="0">
+              <a:spcBef>
+                <a:spcPts val="0"/>
+              </a:spcBef>
+              <a:spcAft>
+                <a:spcPts val="0"/>
+              </a:spcAft>
+              <a:buFontTx/>
+              <a:buChar char="-"/>
+            </a:pPr>
+            <a:r>
+              <a:rPr lang="en-AU" dirty="0"/>
+              <a:t>Under this strategy, if we assume that low risk customers who do not churn this month, would not churn for the next 12 months, and at least half of the customers offered this promotion would take it, we would get 2.4% uplift in revenue in the next 12 months.</a:t>
+            </a:r>
+          </a:p>
+          <a:p>
+            <a:pPr marL="171450" lvl="0" indent="-171450" algn="l" rtl="0">
+              <a:spcBef>
+                <a:spcPts val="0"/>
+              </a:spcBef>
+              <a:spcAft>
+                <a:spcPts val="0"/>
+              </a:spcAft>
+              <a:buFontTx/>
+              <a:buChar char="-"/>
+            </a:pPr>
+            <a:r>
+              <a:rPr lang="en-AU" dirty="0"/>
+              <a:t>We also observe that Random Forest doesn’t perform well under this strategy, which emphasises using the right model for the strategy we want to apply.</a:t>
+            </a:r>
+            <a:endParaRPr dirty="0"/>
           </a:p>
         </p:txBody>
       </p:sp>
@@ -1064,6 +1156,67 @@
           </a:bodyPr>
           <a:lstStyle/>
           <a:p>
+            <a:pPr marL="171450" lvl="0" indent="-171450" algn="l" rtl="0">
+              <a:spcBef>
+                <a:spcPts val="0"/>
+              </a:spcBef>
+              <a:spcAft>
+                <a:spcPts val="0"/>
+              </a:spcAft>
+              <a:buFontTx/>
+              <a:buChar char="-"/>
+            </a:pPr>
+            <a:r>
+              <a:rPr lang="en-AU" dirty="0"/>
+              <a:t>So as the next step, my suggestion is to run an AB test to see how these strategies and models work in real world. This is necessary because offline evaluation has retractions due to the assumptions and may not be realistic.</a:t>
+            </a:r>
+          </a:p>
+          <a:p>
+            <a:pPr marL="171450" lvl="0" indent="-171450" algn="l" rtl="0">
+              <a:spcBef>
+                <a:spcPts val="0"/>
+              </a:spcBef>
+              <a:spcAft>
+                <a:spcPts val="0"/>
+              </a:spcAft>
+              <a:buFontTx/>
+              <a:buChar char="-"/>
+            </a:pPr>
+            <a:r>
+              <a:rPr lang="en-AU" dirty="0"/>
+              <a:t>I suggest we run three solutions, 33% in each bucket. A no promotion, B monthly promotion with no locked-in contract, and C yearly promotion to high risk customers with lock-in.</a:t>
+            </a:r>
+          </a:p>
+          <a:p>
+            <a:pPr marL="171450" lvl="0" indent="-171450" algn="l" rtl="0">
+              <a:spcBef>
+                <a:spcPts val="0"/>
+              </a:spcBef>
+              <a:spcAft>
+                <a:spcPts val="0"/>
+              </a:spcAft>
+              <a:buFontTx/>
+              <a:buChar char="-"/>
+            </a:pPr>
+            <a:r>
+              <a:rPr lang="en-AU" dirty="0"/>
+              <a:t>Then we can track the revenues from each group for several months and conclude which solution results in higher revenues.</a:t>
+            </a:r>
+          </a:p>
+          <a:p>
+            <a:pPr marL="171450" lvl="0" indent="-171450" algn="l" rtl="0">
+              <a:spcBef>
+                <a:spcPts val="0"/>
+              </a:spcBef>
+              <a:spcAft>
+                <a:spcPts val="0"/>
+              </a:spcAft>
+              <a:buFontTx/>
+              <a:buChar char="-"/>
+            </a:pPr>
+            <a:endParaRPr lang="en-AU" dirty="0"/>
+          </a:p>
+          <a:p>
             <a:pPr marL="0" lvl="0" indent="0" algn="l" rtl="0">
               <a:spcBef>
                 <a:spcPts val="0"/>
@@ -1073,7 +1226,7 @@
               </a:spcAft>
               <a:buNone/>
             </a:pPr>
-            <a:endParaRPr/>
+            <a:endParaRPr dirty="0"/>
           </a:p>
         </p:txBody>
       </p:sp>
@@ -1182,7 +1335,7 @@
               </a:spcAft>
               <a:buNone/>
             </a:pPr>
-            <a:endParaRPr/>
+            <a:endParaRPr dirty="0"/>
           </a:p>
         </p:txBody>
       </p:sp>
@@ -1291,7 +1444,66 @@
               </a:spcAft>
               <a:buNone/>
             </a:pPr>
-            <a:endParaRPr/>
+            <a:r>
+              <a:rPr lang="en-AU" dirty="0"/>
+              <a:t>- So first I’ll start with introducing the problem, what customer churn prediction is, and why it is important.</a:t>
+            </a:r>
+          </a:p>
+          <a:p>
+            <a:pPr marL="171450" lvl="0" indent="-171450" algn="l" rtl="0">
+              <a:spcBef>
+                <a:spcPts val="0"/>
+              </a:spcBef>
+              <a:spcAft>
+                <a:spcPts val="0"/>
+              </a:spcAft>
+              <a:buFontTx/>
+              <a:buChar char="-"/>
+            </a:pPr>
+            <a:r>
+              <a:rPr lang="en-AU" dirty="0"/>
+              <a:t>Then I’ll elaborate on the proposed solution</a:t>
+            </a:r>
+            <a:br>
+              <a:rPr lang="en-AU" dirty="0"/>
+            </a:br>
+            <a:r>
+              <a:rPr lang="en-AU" dirty="0"/>
+              <a:t>- I’ll present the results from two sets of offline evaluation, first model performance using ML performance metrics, and second the real-world performance of the solution when used to guide a couple of promotion strategies</a:t>
+            </a:r>
+          </a:p>
+          <a:p>
+            <a:pPr marL="171450" lvl="0" indent="-171450" algn="l" rtl="0">
+              <a:spcBef>
+                <a:spcPts val="0"/>
+              </a:spcBef>
+              <a:spcAft>
+                <a:spcPts val="0"/>
+              </a:spcAft>
+              <a:buFontTx/>
+              <a:buChar char="-"/>
+            </a:pPr>
+            <a:r>
+              <a:rPr lang="en-AU" dirty="0"/>
+              <a:t>I’ll propose online experiments that we can run as the next step,</a:t>
+            </a:r>
+          </a:p>
+          <a:p>
+            <a:pPr marL="171450" lvl="0" indent="-171450" algn="l" rtl="0">
+              <a:spcBef>
+                <a:spcPts val="0"/>
+              </a:spcBef>
+              <a:spcAft>
+                <a:spcPts val="0"/>
+              </a:spcAft>
+              <a:buFontTx/>
+              <a:buChar char="-"/>
+            </a:pPr>
+            <a:r>
+              <a:rPr lang="en-AU" dirty="0"/>
+              <a:t>And finally I’ll conclude the presentation by summing up the main highlights and giving the future direction</a:t>
+            </a:r>
+            <a:endParaRPr dirty="0"/>
           </a:p>
         </p:txBody>
       </p:sp>
@@ -1400,7 +1612,91 @@
               </a:spcAft>
               <a:buNone/>
             </a:pPr>
-            <a:endParaRPr/>
+            <a:r>
+              <a:rPr lang="en-AU" dirty="0"/>
+              <a:t>So what is customer churn?</a:t>
+            </a:r>
+          </a:p>
+          <a:p>
+            <a:pPr marL="171450" lvl="0" indent="-171450" algn="l" rtl="0">
+              <a:spcBef>
+                <a:spcPts val="0"/>
+              </a:spcBef>
+              <a:spcAft>
+                <a:spcPts val="0"/>
+              </a:spcAft>
+              <a:buFontTx/>
+              <a:buChar char="-"/>
+            </a:pPr>
+            <a:r>
+              <a:rPr lang="en-AU" dirty="0"/>
+              <a:t>Customer churn is one of the most important KPIs for companies that use a subscription based business model</a:t>
+            </a:r>
+          </a:p>
+          <a:p>
+            <a:pPr marL="171450" lvl="0" indent="-171450" algn="l" rtl="0">
+              <a:spcBef>
+                <a:spcPts val="0"/>
+              </a:spcBef>
+              <a:spcAft>
+                <a:spcPts val="0"/>
+              </a:spcAft>
+              <a:buFontTx/>
+              <a:buChar char="-"/>
+            </a:pPr>
+            <a:r>
+              <a:rPr lang="en-AU" dirty="0"/>
+              <a:t>It is defined as the percentage of customers who give up using our products or services within a specific period of time</a:t>
+            </a:r>
+          </a:p>
+          <a:p>
+            <a:pPr marL="171450" lvl="0" indent="-171450" algn="l" rtl="0">
+              <a:spcBef>
+                <a:spcPts val="0"/>
+              </a:spcBef>
+              <a:spcAft>
+                <a:spcPts val="0"/>
+              </a:spcAft>
+              <a:buFontTx/>
+              <a:buChar char="-"/>
+            </a:pPr>
+            <a:r>
+              <a:rPr lang="en-AU" dirty="0"/>
+              <a:t>This problem is utterly important for business specially in companies that have a high customer acquisition cost. E.g. telecom companies, technologies. etc.</a:t>
+            </a:r>
+          </a:p>
+          <a:p>
+            <a:pPr marL="171450" lvl="0" indent="-171450" algn="l" rtl="0">
+              <a:spcBef>
+                <a:spcPts val="0"/>
+              </a:spcBef>
+              <a:spcAft>
+                <a:spcPts val="0"/>
+              </a:spcAft>
+              <a:buFontTx/>
+              <a:buChar char="-"/>
+            </a:pPr>
+            <a:r>
+              <a:rPr lang="en-AU" dirty="0"/>
+              <a:t>If these companies could predict what customers have higher risk of churning, they can intervene and try to keep those customers and hence get great profit from doing so</a:t>
+            </a:r>
+          </a:p>
+          <a:p>
+            <a:pPr marL="171450" lvl="0" indent="-171450" algn="l" rtl="0">
+              <a:spcBef>
+                <a:spcPts val="0"/>
+              </a:spcBef>
+              <a:spcAft>
+                <a:spcPts val="0"/>
+              </a:spcAft>
+              <a:buFontTx/>
+              <a:buChar char="-"/>
+            </a:pPr>
+            <a:r>
+              <a:rPr lang="en-AU" dirty="0"/>
+              <a:t>For example, we can proactively engage with them, let’s say offer promotions and make them stay with us</a:t>
+            </a:r>
+            <a:endParaRPr dirty="0"/>
           </a:p>
         </p:txBody>
       </p:sp>
@@ -1509,7 +1805,66 @@
               </a:spcAft>
               <a:buNone/>
             </a:pPr>
-            <a:endParaRPr/>
+            <a:r>
+              <a:rPr lang="en-AU" dirty="0"/>
+              <a:t>So here is the steps for the proposed MF solution:</a:t>
+            </a:r>
+          </a:p>
+          <a:p>
+            <a:pPr marL="171450" lvl="0" indent="-171450" algn="l" rtl="0">
+              <a:spcBef>
+                <a:spcPts val="0"/>
+              </a:spcBef>
+              <a:spcAft>
+                <a:spcPts val="0"/>
+              </a:spcAft>
+              <a:buFontTx/>
+              <a:buChar char="-"/>
+            </a:pPr>
+            <a:r>
+              <a:rPr lang="en-AU" dirty="0"/>
+              <a:t>The solution involves two sets of steps: </a:t>
+            </a:r>
+          </a:p>
+          <a:p>
+            <a:pPr marL="628650" lvl="1" indent="-171450" algn="l" rtl="0">
+              <a:spcBef>
+                <a:spcPts val="0"/>
+              </a:spcBef>
+              <a:spcAft>
+                <a:spcPts val="0"/>
+              </a:spcAft>
+              <a:buFontTx/>
+              <a:buChar char="-"/>
+            </a:pPr>
+            <a:r>
+              <a:rPr lang="en-AU" dirty="0"/>
+              <a:t>Offline, which includes data pre-processing, feature encoding, … and offline evaluation. It covers all the steps right before deploying the model to production. </a:t>
+            </a:r>
+          </a:p>
+          <a:p>
+            <a:pPr marL="628650" lvl="1" indent="-171450" algn="l" rtl="0">
+              <a:spcBef>
+                <a:spcPts val="0"/>
+              </a:spcBef>
+              <a:spcAft>
+                <a:spcPts val="0"/>
+              </a:spcAft>
+              <a:buFontTx/>
+              <a:buChar char="-"/>
+            </a:pPr>
+            <a:r>
+              <a:rPr lang="en-AU" dirty="0"/>
+              <a:t>Online, which includes model deployment for example using </a:t>
+            </a:r>
+            <a:r>
+              <a:rPr lang="en-AU" dirty="0" err="1"/>
+              <a:t>mlflow</a:t>
+            </a:r>
+            <a:r>
+              <a:rPr lang="en-AU" dirty="0"/>
+              <a:t> or a proprietary deployment pipeline, and then configure an AB test to evaluate the new solution online and finally scale up the solution to 100% of the users.</a:t>
+            </a:r>
           </a:p>
         </p:txBody>
       </p:sp>
@@ -1609,16 +1964,44 @@
           </a:bodyPr>
           <a:lstStyle/>
           <a:p>
-            <a:pPr marL="0" lvl="0" indent="0" algn="l" rtl="0">
+            <a:pPr marL="171450" lvl="0" indent="-171450" algn="l" rtl="0">
               <a:spcBef>
                 <a:spcPts val="0"/>
               </a:spcBef>
               <a:spcAft>
                 <a:spcPts val="0"/>
               </a:spcAft>
-              <a:buNone/>
-            </a:pPr>
-            <a:endParaRPr/>
+              <a:buFontTx/>
+              <a:buChar char="-"/>
+            </a:pPr>
+            <a:r>
+              <a:rPr lang="en-AU" dirty="0"/>
+              <a:t>In data pre-processing step we do any cleaning and replacing empty values and normalising types, etc. I noticed for example </a:t>
+            </a:r>
+            <a:r>
+              <a:rPr lang="en-AU" dirty="0" err="1"/>
+              <a:t>TotalCharges</a:t>
+            </a:r>
+            <a:r>
+              <a:rPr lang="en-AU" dirty="0"/>
+              <a:t> filed was not numeric and had some empty values so I normalised that, I also changed </a:t>
+            </a:r>
+            <a:r>
+              <a:rPr lang="en-AU" dirty="0" err="1"/>
+              <a:t>SeniorCitizen</a:t>
+            </a:r>
+            <a:r>
+              <a:rPr lang="en-AU" dirty="0"/>
+              <a:t> to Yes/No, although this one was not necessary. Only for the dataset to look consistent. Also set the </a:t>
+            </a:r>
+            <a:r>
+              <a:rPr lang="en-AU" dirty="0" err="1"/>
+              <a:t>CustomerID</a:t>
+            </a:r>
+            <a:r>
+              <a:rPr lang="en-AU" dirty="0"/>
+              <a:t> as the index of the table.</a:t>
+            </a:r>
           </a:p>
         </p:txBody>
       </p:sp>
@@ -1718,16 +2101,53 @@
           </a:bodyPr>
           <a:lstStyle/>
           <a:p>
-            <a:pPr marL="0" lvl="0" indent="0" algn="l" rtl="0">
+            <a:pPr marL="171450" lvl="0" indent="-171450" algn="l" rtl="0">
               <a:spcBef>
                 <a:spcPts val="0"/>
               </a:spcBef>
               <a:spcAft>
                 <a:spcPts val="0"/>
               </a:spcAft>
-              <a:buNone/>
-            </a:pPr>
-            <a:endParaRPr/>
+              <a:buFontTx/>
+              <a:buChar char="-"/>
+            </a:pPr>
+            <a:r>
+              <a:rPr lang="en-AU" dirty="0"/>
+              <a:t>The next step is feature encoding. This is a critical step in Machine Learning, since most of machine learning models can only work with numerical values, in this step we map all features into numerical features.</a:t>
+            </a:r>
+          </a:p>
+          <a:p>
+            <a:pPr marL="171450" lvl="0" indent="-171450" algn="l" rtl="0">
+              <a:spcBef>
+                <a:spcPts val="0"/>
+              </a:spcBef>
+              <a:spcAft>
+                <a:spcPts val="0"/>
+              </a:spcAft>
+              <a:buFontTx/>
+              <a:buChar char="-"/>
+            </a:pPr>
+            <a:r>
+              <a:rPr lang="en-AU" dirty="0"/>
+              <a:t>Numerical features don’t need encoding, so we leave them as it is. As for the categorical features, we check how many unique values each feature has. For two value features, we use label encoding, which simply assigns 0 for one value and 1 for the other value. For multi value features however if we use label encoding, the natural ordered relationship between integer feature values may be picked up by the model that is not desirable. For example, 2000 for salary is greater than 1000, but we don’t have this relationship between categorical values encoded using label encoding.</a:t>
+            </a:r>
+          </a:p>
+          <a:p>
+            <a:pPr marL="171450" lvl="0" indent="-171450" algn="l" rtl="0">
+              <a:spcBef>
+                <a:spcPts val="0"/>
+              </a:spcBef>
+              <a:spcAft>
+                <a:spcPts val="0"/>
+              </a:spcAft>
+              <a:buFontTx/>
+              <a:buChar char="-"/>
+            </a:pPr>
+            <a:r>
+              <a:rPr lang="en-AU" dirty="0"/>
+              <a:t>So we use one hot encoding that assigns one Boolean value per feature value, and if that value exists gives 1, if not 0.</a:t>
+            </a:r>
+            <a:endParaRPr dirty="0"/>
           </a:p>
         </p:txBody>
       </p:sp>
@@ -1827,16 +2247,46 @@
           </a:bodyPr>
           <a:lstStyle/>
           <a:p>
-            <a:pPr marL="0" lvl="0" indent="0" algn="l" rtl="0">
-              <a:spcBef>
-                <a:spcPts val="0"/>
-              </a:spcBef>
-              <a:spcAft>
-                <a:spcPts val="0"/>
-              </a:spcAft>
-              <a:buNone/>
-            </a:pPr>
-            <a:endParaRPr/>
+            <a:pPr fontAlgn="base"/>
+            <a:r>
+              <a:rPr lang="en-AU" sz="1200" b="0" kern="1200" dirty="0">
+                <a:solidFill>
+                  <a:schemeClr val="tx1"/>
+                </a:solidFill>
+                <a:effectLst/>
+                <a:latin typeface="+mn-lt"/>
+                <a:ea typeface="+mn-ea"/>
+                <a:cs typeface="+mn-cs"/>
+              </a:rPr>
+              <a:t>Takes the mean value in each column and assigns zero to it if present, and then centres the other values around zero with values both positive and negative having variance as 1.</a:t>
+            </a:r>
+          </a:p>
+          <a:p>
+            <a:pPr fontAlgn="base"/>
+            <a:endParaRPr lang="en-AU" sz="1200" b="0" kern="1200" dirty="0">
+              <a:solidFill>
+                <a:schemeClr val="tx1"/>
+              </a:solidFill>
+              <a:effectLst/>
+              <a:latin typeface="+mn-lt"/>
+              <a:ea typeface="+mn-ea"/>
+              <a:cs typeface="+mn-cs"/>
+            </a:endParaRPr>
+          </a:p>
+          <a:p>
+            <a:pPr fontAlgn="base"/>
+            <a:r>
+              <a:rPr lang="en-AU" sz="1200" b="0" kern="1200" dirty="0">
+                <a:solidFill>
+                  <a:schemeClr val="tx1"/>
+                </a:solidFill>
+                <a:effectLst/>
+                <a:latin typeface="+mn-lt"/>
+                <a:ea typeface="+mn-ea"/>
+                <a:cs typeface="+mn-cs"/>
+              </a:rPr>
+              <a:t>We can see that the mean value in each column is assigned a value of 0.0 if present and the values are cantered around 0.0 with values both positive and negative.</a:t>
+            </a:r>
           </a:p>
         </p:txBody>
       </p:sp>
@@ -1945,7 +2395,11 @@
               </a:spcAft>
               <a:buNone/>
             </a:pPr>
-            <a:endParaRPr/>
+            <a:r>
+              <a:rPr lang="en-AU" dirty="0"/>
+              <a:t>I trained three models using the features extracted in the previous steps: Random Forests, Logistic Regression, ANN.</a:t>
+            </a:r>
+            <a:endParaRPr dirty="0"/>
           </a:p>
         </p:txBody>
       </p:sp>
@@ -2054,7 +2508,102 @@
               </a:spcAft>
               <a:buNone/>
             </a:pPr>
-            <a:endParaRPr/>
+            <a:r>
+              <a:rPr lang="en-AU" dirty="0"/>
+              <a:t>To evaluate the model performance, I chose to plot ROC chart and Area Under ROC, which represents how successfully the model can separate positive samples from negative samples.</a:t>
+            </a:r>
+          </a:p>
+          <a:p>
+            <a:pPr marL="0" lvl="0" indent="0" algn="l" rtl="0">
+              <a:spcBef>
+                <a:spcPts val="0"/>
+              </a:spcBef>
+              <a:spcAft>
+                <a:spcPts val="0"/>
+              </a:spcAft>
+              <a:buNone/>
+            </a:pPr>
+            <a:r>
+              <a:rPr lang="en-AU" dirty="0"/>
+              <a:t>I also chose other metrics like accuracy, precision, recall, f1 and f2 measures.</a:t>
+            </a:r>
+          </a:p>
+          <a:p>
+            <a:pPr marL="0" lvl="0" indent="0" algn="l" rtl="0">
+              <a:spcBef>
+                <a:spcPts val="0"/>
+              </a:spcBef>
+              <a:spcAft>
+                <a:spcPts val="0"/>
+              </a:spcAft>
+              <a:buNone/>
+            </a:pPr>
+            <a:endParaRPr lang="en-AU" dirty="0"/>
+          </a:p>
+          <a:p>
+            <a:pPr marL="171450" lvl="0" indent="-171450" algn="l" rtl="0">
+              <a:spcBef>
+                <a:spcPts val="0"/>
+              </a:spcBef>
+              <a:spcAft>
+                <a:spcPts val="0"/>
+              </a:spcAft>
+              <a:buFontTx/>
+              <a:buChar char="-"/>
+            </a:pPr>
+            <a:r>
+              <a:rPr lang="en-AU" dirty="0"/>
+              <a:t>Precision means what percentage of predicted positives are actually positive</a:t>
+            </a:r>
+          </a:p>
+          <a:p>
+            <a:pPr marL="171450" lvl="0" indent="-171450" algn="l" rtl="0">
+              <a:spcBef>
+                <a:spcPts val="0"/>
+              </a:spcBef>
+              <a:spcAft>
+                <a:spcPts val="0"/>
+              </a:spcAft>
+              <a:buFontTx/>
+              <a:buChar char="-"/>
+            </a:pPr>
+            <a:r>
+              <a:rPr lang="en-AU" dirty="0"/>
+              <a:t>Recall means what percentage of actual positives are predicated correctly as positive</a:t>
+            </a:r>
+          </a:p>
+          <a:p>
+            <a:pPr marL="171450" lvl="0" indent="-171450" algn="l" rtl="0">
+              <a:spcBef>
+                <a:spcPts val="0"/>
+              </a:spcBef>
+              <a:spcAft>
+                <a:spcPts val="0"/>
+              </a:spcAft>
+              <a:buFontTx/>
+              <a:buChar char="-"/>
+            </a:pPr>
+            <a:r>
+              <a:rPr lang="en-AU" dirty="0"/>
+              <a:t>F1 measure combines precision and recall into one metric giving same weight for recall and precision</a:t>
+            </a:r>
+          </a:p>
+          <a:p>
+            <a:pPr marL="171450" lvl="0" indent="-171450" algn="l" rtl="0">
+              <a:spcBef>
+                <a:spcPts val="0"/>
+              </a:spcBef>
+              <a:spcAft>
+                <a:spcPts val="0"/>
+              </a:spcAft>
+              <a:buFontTx/>
+              <a:buChar char="-"/>
+            </a:pPr>
+            <a:r>
+              <a:rPr lang="en-AU" dirty="0"/>
+              <a:t>F2 measure is similar to F1 measure, but gives more importance to recall, because missed actual positives are very expensive</a:t>
+            </a:r>
+            <a:endParaRPr dirty="0"/>
           </a:p>
         </p:txBody>
       </p:sp>
@@ -2200,7 +2749,7 @@
           <a:p>
             <a:fld id="{846CE7D5-CF57-46EF-B807-FDD0502418D4}" type="datetimeFigureOut">
               <a:rPr lang="en-US" smtClean="0"/>
-              <a:t>4/20/22</a:t>
+              <a:t>4/28/22</a:t>
             </a:fld>
             <a:endParaRPr lang="en-US"/>
           </a:p>
@@ -2368,7 +2917,7 @@
           <a:p>
             <a:fld id="{846CE7D5-CF57-46EF-B807-FDD0502418D4}" type="datetimeFigureOut">
               <a:rPr lang="en-US" smtClean="0"/>
-              <a:t>4/20/22</a:t>
+              <a:t>4/28/22</a:t>
             </a:fld>
             <a:endParaRPr lang="en-US"/>
           </a:p>
@@ -2546,7 +3095,7 @@
           <a:p>
             <a:fld id="{846CE7D5-CF57-46EF-B807-FDD0502418D4}" type="datetimeFigureOut">
               <a:rPr lang="en-US" smtClean="0"/>
-              <a:t>4/20/22</a:t>
+              <a:t>4/28/22</a:t>
             </a:fld>
             <a:endParaRPr lang="en-US"/>
           </a:p>
@@ -3219,7 +3768,7 @@
           <a:p>
             <a:fld id="{846CE7D5-CF57-46EF-B807-FDD0502418D4}" type="datetimeFigureOut">
               <a:rPr lang="en-US" smtClean="0"/>
-              <a:t>4/20/22</a:t>
+              <a:t>4/28/22</a:t>
             </a:fld>
             <a:endParaRPr lang="en-US"/>
           </a:p>
@@ -3464,7 +4013,7 @@
           <a:p>
             <a:fld id="{846CE7D5-CF57-46EF-B807-FDD0502418D4}" type="datetimeFigureOut">
               <a:rPr lang="en-US" smtClean="0"/>
-              <a:t>4/20/22</a:t>
+              <a:t>4/28/22</a:t>
             </a:fld>
             <a:endParaRPr lang="en-US"/>
           </a:p>
@@ -3693,7 +4242,7 @@
           <a:p>
             <a:fld id="{846CE7D5-CF57-46EF-B807-FDD0502418D4}" type="datetimeFigureOut">
               <a:rPr lang="en-US" smtClean="0"/>
-              <a:t>4/20/22</a:t>
+              <a:t>4/28/22</a:t>
             </a:fld>
             <a:endParaRPr lang="en-US"/>
           </a:p>
@@ -4057,7 +4606,7 @@
           <a:p>
             <a:fld id="{846CE7D5-CF57-46EF-B807-FDD0502418D4}" type="datetimeFigureOut">
               <a:rPr lang="en-US" smtClean="0"/>
-              <a:t>4/20/22</a:t>
+              <a:t>4/28/22</a:t>
             </a:fld>
             <a:endParaRPr lang="en-US"/>
           </a:p>
@@ -4174,7 +4723,7 @@
           <a:p>
             <a:fld id="{846CE7D5-CF57-46EF-B807-FDD0502418D4}" type="datetimeFigureOut">
               <a:rPr lang="en-US" smtClean="0"/>
-              <a:t>4/20/22</a:t>
+              <a:t>4/28/22</a:t>
             </a:fld>
             <a:endParaRPr lang="en-US"/>
           </a:p>
@@ -4269,7 +4818,7 @@
           <a:p>
             <a:fld id="{846CE7D5-CF57-46EF-B807-FDD0502418D4}" type="datetimeFigureOut">
               <a:rPr lang="en-US" smtClean="0"/>
-              <a:t>4/20/22</a:t>
+              <a:t>4/28/22</a:t>
             </a:fld>
             <a:endParaRPr lang="en-US"/>
           </a:p>
@@ -4544,7 +5093,7 @@
           <a:p>
             <a:fld id="{846CE7D5-CF57-46EF-B807-FDD0502418D4}" type="datetimeFigureOut">
               <a:rPr lang="en-US" smtClean="0"/>
-              <a:t>4/20/22</a:t>
+              <a:t>4/28/22</a:t>
             </a:fld>
             <a:endParaRPr lang="en-US"/>
           </a:p>
@@ -4799,7 +5348,7 @@
           <a:p>
             <a:fld id="{846CE7D5-CF57-46EF-B807-FDD0502418D4}" type="datetimeFigureOut">
               <a:rPr lang="en-US" smtClean="0"/>
-              <a:t>4/20/22</a:t>
+              <a:t>4/28/22</a:t>
             </a:fld>
             <a:endParaRPr lang="en-US"/>
           </a:p>
@@ -5010,7 +5559,7 @@
           <a:p>
             <a:fld id="{846CE7D5-CF57-46EF-B807-FDD0502418D4}" type="datetimeFigureOut">
               <a:rPr lang="en-US" smtClean="0"/>
-              <a:t>4/20/22</a:t>
+              <a:t>4/28/22</a:t>
             </a:fld>
             <a:endParaRPr lang="en-US"/>
           </a:p>
@@ -7156,7 +7705,7 @@
                 <a:ea typeface="+mn-lt"/>
                 <a:cs typeface="+mn-lt"/>
               </a:rPr>
-              <a:t>Customers are randomly split into two groups with 33% in each</a:t>
+              <a:t>Customers are randomly split into three groups with 33% in each</a:t>
             </a:r>
           </a:p>
           <a:p>
@@ -7239,7 +7788,21 @@
                 <a:ea typeface="+mn-lt"/>
                 <a:cs typeface="+mn-lt"/>
               </a:rPr>
-              <a:t>Total revenues from monthly subscriptions are calculated for both groups after several months following the promotions</a:t>
+              <a:t>Total revenues from monthly subscriptions are calculated </a:t>
+            </a:r>
+            <a:r>
+              <a:rPr lang="en-US" sz="2000">
+                <a:ea typeface="+mn-lt"/>
+                <a:cs typeface="+mn-lt"/>
+              </a:rPr>
+              <a:t>for all </a:t>
+            </a:r>
+            <a:r>
+              <a:rPr lang="en-US" sz="2000" dirty="0">
+                <a:ea typeface="+mn-lt"/>
+                <a:cs typeface="+mn-lt"/>
+              </a:rPr>
+              <a:t>groups after several months following the promotions</a:t>
             </a:r>
           </a:p>
           <a:p>
@@ -7524,7 +8087,7 @@
                 <a:ea typeface="+mn-lt"/>
                 <a:cs typeface="+mn-lt"/>
               </a:rPr>
-              <a:t>We proposed an ML based solution to predict churn propensity of customers from an interne service provider</a:t>
+              <a:t>We proposed an ML based solution to predict churn propensity of customers from an internet service provider</a:t>
             </a:r>
           </a:p>
           <a:p>
@@ -10408,7 +10971,7 @@
         <p:spPr>
           <a:xfrm>
             <a:off x="207818" y="966366"/>
-            <a:ext cx="10058399" cy="4894107"/>
+            <a:ext cx="11354657" cy="5595072"/>
           </a:xfrm>
           <a:prstGeom prst="rect">
             <a:avLst/>

</xml_diff>